<commit_message>
revisão sabha closes #21
</commit_message>
<xml_diff>
--- a/1º semestre/Revisões by danny/Revisão de Matemática Discreta.pptx
+++ b/1º semestre/Revisões by danny/Revisão de Matemática Discreta.pptx
@@ -221,7 +221,7 @@
           <a:p>
             <a:fld id="{9A02C3CF-9CFA-4B8C-9DF6-F57743F6B3BA}" type="datetimeFigureOut">
               <a:rPr lang="pt-BR" smtClean="0"/>
-              <a:t>15/04/2018</a:t>
+              <a:t>16/04/2018</a:t>
             </a:fld>
             <a:endParaRPr lang="pt-BR"/>
           </a:p>
@@ -3888,16 +3888,16 @@
             </a:pPr>
             <a:r>
               <a:rPr lang="pt-BR" dirty="0"/>
-              <a:t>Portanto, nessa relação R cada elemento de A está relacionada a no máximo um elemento de B. Na Matriz: </a:t>
-            </a:r>
-          </a:p>
-          <a:p>
-            <a:pPr marL="0" indent="0">
-              <a:buNone/>
-            </a:pPr>
-            <a:r>
-              <a:rPr lang="pt-BR" dirty="0"/>
-              <a:t>	No máximo um valor verdadeiro em cada linha da matriz.</a:t>
+              <a:t>Portanto, nessa relação R cada elemento de A está relacionada a no máximo um elemento de B. </a:t>
+            </a:r>
+          </a:p>
+          <a:p>
+            <a:pPr marL="0" indent="0">
+              <a:buNone/>
+            </a:pPr>
+            <a:r>
+              <a:rPr lang="pt-BR" dirty="0"/>
+              <a:t>	Na Matriz:	No máximo um valor verdadeiro em cada linha.</a:t>
             </a:r>
           </a:p>
           <a:p>
@@ -3963,8 +3963,12 @@
           <a:lstStyle/>
           <a:p>
             <a:r>
-              <a:rPr lang="pt-BR" dirty="0"/>
-              <a:t>Injetora: [O inverso da Funcional]</a:t>
+              <a:rPr lang="pt-BR" b="1" dirty="0"/>
+              <a:t>Injetora</a:t>
+            </a:r>
+            <a:r>
+              <a:rPr lang="pt-BR" dirty="0"/>
+              <a:t>: [O inverso da Funcional]</a:t>
             </a:r>
           </a:p>
         </p:txBody>
@@ -4004,7 +4008,7 @@
             </a:pPr>
             <a:r>
               <a:rPr lang="pt-BR" dirty="0"/>
-              <a:t> R: A→B. R é um injetora se </a:t>
+              <a:t> R: A→B. R é injetora se </a:t>
             </a:r>
           </a:p>
           <a:p>
@@ -4024,6 +4028,9 @@
           </a:p>
           <a:p>
             <a:pPr marL="457200" lvl="1" indent="0">
+              <a:spcAft>
+                <a:spcPts val="2400"/>
+              </a:spcAft>
               <a:buNone/>
             </a:pPr>
             <a:r>
@@ -4033,6 +4040,9 @@
           </a:p>
           <a:p>
             <a:pPr marL="457200" lvl="1" indent="0">
+              <a:spcAft>
+                <a:spcPts val="2400"/>
+              </a:spcAft>
               <a:buNone/>
             </a:pPr>
             <a:r>
@@ -4050,6 +4060,9 @@
           </a:p>
           <a:p>
             <a:pPr marL="457200" lvl="1" indent="0">
+              <a:spcAft>
+                <a:spcPts val="2400"/>
+              </a:spcAft>
               <a:buNone/>
             </a:pPr>
             <a:r>
@@ -4230,7 +4243,7 @@
             </a:r>
             <a:r>
               <a:rPr lang="pt-BR" dirty="0"/>
-              <a:t>: Há pelo menos um valor lógico verdadeiro por linha na matriz. </a:t>
+              <a:t>: Há pelo menos um valor lógico verdadeiro por linha. </a:t>
             </a:r>
           </a:p>
         </p:txBody>
@@ -4889,7 +4902,7 @@
             </a:r>
             <a:r>
               <a:rPr lang="pt-BR" dirty="0"/>
-              <a:t>: Há pelo-menos um valor lógico verdadeiro para coluna na matriz. </a:t>
+              <a:t>: Há pelo-menos um valor lógico verdadeiro para coluna. </a:t>
             </a:r>
           </a:p>
           <a:p>
@@ -4968,7 +4981,7 @@
           <a:lstStyle/>
           <a:p>
             <a:r>
-              <a:rPr lang="pt-BR" dirty="0"/>
+              <a:rPr lang="pt-BR" b="1" dirty="0"/>
               <a:t>Monomorfismo</a:t>
             </a:r>
           </a:p>
@@ -5440,7 +5453,7 @@
           <a:lstStyle/>
           <a:p>
             <a:r>
-              <a:rPr lang="pt-BR" dirty="0"/>
+              <a:rPr lang="pt-BR" b="1" dirty="0"/>
               <a:t>Epimorfismo</a:t>
             </a:r>
           </a:p>
@@ -5481,16 +5494,32 @@
             </a:pPr>
             <a:r>
               <a:rPr lang="pt-BR" dirty="0"/>
-              <a:t>	→ Sobrejetora (Pelo menos um valor lógico verdadeiro por coluna) </a:t>
-            </a:r>
-          </a:p>
-          <a:p>
-            <a:pPr marL="0" indent="0">
-              <a:buNone/>
-            </a:pPr>
-            <a:r>
-              <a:rPr lang="pt-BR" dirty="0"/>
-              <a:t>	→ Funcional (Mínimo um valor verdadeiro por linha)</a:t>
+              <a:t>	→</a:t>
+            </a:r>
+            <a:r>
+              <a:rPr lang="pt-BR" b="1" dirty="0"/>
+              <a:t> Sobrejetora </a:t>
+            </a:r>
+            <a:r>
+              <a:rPr lang="pt-BR" dirty="0"/>
+              <a:t>(Pelo menos um valor lógico verdadeiro por coluna) </a:t>
+            </a:r>
+          </a:p>
+          <a:p>
+            <a:pPr marL="0" indent="0">
+              <a:buNone/>
+            </a:pPr>
+            <a:r>
+              <a:rPr lang="pt-BR" dirty="0"/>
+              <a:t>	→</a:t>
+            </a:r>
+            <a:r>
+              <a:rPr lang="pt-BR" b="1" dirty="0"/>
+              <a:t> Funcional </a:t>
+            </a:r>
+            <a:r>
+              <a:rPr lang="pt-BR" dirty="0"/>
+              <a:t>(Mínimo um valor verdadeiro por linha)</a:t>
             </a:r>
           </a:p>
         </p:txBody>
@@ -5921,7 +5950,12 @@
             <p:ph idx="1"/>
           </p:nvPr>
         </p:nvSpPr>
-        <p:spPr/>
+        <p:spPr>
+          <a:xfrm>
+            <a:off x="838200" y="1825625"/>
+            <a:ext cx="10515600" cy="4351338"/>
+          </a:xfrm>
+        </p:spPr>
         <p:txBody>
           <a:bodyPr/>
           <a:lstStyle/>
@@ -5940,16 +5974,34 @@
             </a:pPr>
             <a:r>
               <a:rPr lang="pt-BR" dirty="0"/>
-              <a:t> 	→ Total → Sobrejetora </a:t>
-            </a:r>
-          </a:p>
-          <a:p>
-            <a:pPr marL="0" indent="0">
-              <a:buNone/>
-            </a:pPr>
-            <a:r>
-              <a:rPr lang="pt-BR" dirty="0"/>
-              <a:t>	→ Funcional → Injetora</a:t>
+              <a:t> 	→ Total </a:t>
+            </a:r>
+          </a:p>
+          <a:p>
+            <a:pPr marL="0" indent="0">
+              <a:buNone/>
+            </a:pPr>
+            <a:r>
+              <a:rPr lang="pt-BR" dirty="0"/>
+              <a:t>	→ Sobrejetora </a:t>
+            </a:r>
+          </a:p>
+          <a:p>
+            <a:pPr marL="0" indent="0">
+              <a:buNone/>
+            </a:pPr>
+            <a:r>
+              <a:rPr lang="pt-BR" dirty="0"/>
+              <a:t>	→ Funcional </a:t>
+            </a:r>
+          </a:p>
+          <a:p>
+            <a:pPr marL="0" indent="0">
+              <a:buNone/>
+            </a:pPr>
+            <a:r>
+              <a:rPr lang="pt-BR" dirty="0"/>
+              <a:t>	→ Injetora</a:t>
             </a:r>
           </a:p>
         </p:txBody>
@@ -6037,19 +6089,19 @@
               <a:buNone/>
             </a:pPr>
             <a:r>
-              <a:rPr lang="pt-BR" dirty="0"/>
+              <a:rPr lang="pt-BR" sz="3200" dirty="0"/>
               <a:t>Definindo conjuntos</a:t>
             </a:r>
           </a:p>
           <a:p>
             <a:r>
-              <a:rPr lang="pt-BR" dirty="0"/>
+              <a:rPr lang="pt-BR" sz="3200" dirty="0"/>
               <a:t>Ideia de agrupamento</a:t>
             </a:r>
           </a:p>
           <a:p>
             <a:r>
-              <a:rPr lang="pt-BR" dirty="0"/>
+              <a:rPr lang="pt-BR" sz="3200" dirty="0"/>
               <a:t>Estrutura que agrupa objetos com base para construir estruturas mais complexas.</a:t>
             </a:r>
           </a:p>
@@ -6145,7 +6197,15 @@
             </a:pPr>
             <a:r>
               <a:rPr lang="pt-BR" dirty="0"/>
-              <a:t>Uma endorrelação é uma relação binária interna de um conjunto (dança do passarinho). Também pode ser chamada “autorrelação”</a:t>
+              <a:t>Uma endorrelação é uma relação binária interna de um conjunto (dança do passarinho). Também pode ser chamada “</a:t>
+            </a:r>
+            <a:r>
+              <a:rPr lang="pt-BR" dirty="0" err="1"/>
+              <a:t>autorrelação</a:t>
+            </a:r>
+            <a:r>
+              <a:rPr lang="pt-BR" dirty="0"/>
+              <a:t>”</a:t>
             </a:r>
           </a:p>
           <a:p>
@@ -6581,7 +6641,12 @@
             <p:ph idx="1"/>
           </p:nvPr>
         </p:nvSpPr>
-        <p:spPr/>
+        <p:spPr>
+          <a:xfrm>
+            <a:off x="838200" y="1825625"/>
+            <a:ext cx="10515600" cy="4351338"/>
+          </a:xfrm>
+        </p:spPr>
         <p:txBody>
           <a:bodyPr/>
           <a:lstStyle/>
@@ -6768,17 +6833,25 @@
               <a:buNone/>
             </a:pPr>
             <a:r>
-              <a:rPr lang="pt-BR" dirty="0"/>
-              <a:t>Na matriz: A diagonal principal da matriz só apresenta valores lógicos falso </a:t>
-            </a:r>
-          </a:p>
-          <a:p>
-            <a:pPr marL="0" indent="0">
-              <a:buNone/>
-            </a:pPr>
-            <a:r>
-              <a:rPr lang="pt-BR" dirty="0"/>
-              <a:t>No grafo: Não tem dança do passarinho.</a:t>
+              <a:rPr lang="pt-BR" b="1" dirty="0"/>
+              <a:t>Na matriz: </a:t>
+            </a:r>
+            <a:r>
+              <a:rPr lang="pt-BR" dirty="0"/>
+              <a:t>A diagonal principal da matriz só apresenta valores lógicos falsos </a:t>
+            </a:r>
+          </a:p>
+          <a:p>
+            <a:pPr marL="0" indent="0">
+              <a:buNone/>
+            </a:pPr>
+            <a:r>
+              <a:rPr lang="pt-BR" b="1" dirty="0"/>
+              <a:t>No grafo: </a:t>
+            </a:r>
+            <a:r>
+              <a:rPr lang="pt-BR" dirty="0"/>
+              <a:t>Não tem dança do passarinho.</a:t>
             </a:r>
           </a:p>
           <a:p>
@@ -7002,7 +7075,7 @@
           <a:p>
             <a:r>
               <a:rPr lang="pt-BR" dirty="0"/>
-              <a:t>Relação Antissimétrica</a:t>
+              <a:t>Relação Assimétrica</a:t>
             </a:r>
           </a:p>
         </p:txBody>
@@ -7115,15 +7188,7 @@
             </a:r>
             <a:r>
               <a:rPr lang="pt-BR" dirty="0"/>
-              <a:t>A metade </a:t>
-            </a:r>
-            <a:r>
-              <a:rPr lang="pt-BR" dirty="0" err="1"/>
-              <a:t>aciam</a:t>
-            </a:r>
-            <a:r>
-              <a:rPr lang="pt-BR" dirty="0"/>
-              <a:t> da diagonal principal é diferente da metade de baixo, célula a </a:t>
+              <a:t>A metade acima da diagonal principal é diferente da metade de baixo, célula a </a:t>
             </a:r>
           </a:p>
           <a:p>

</xml_diff>

<commit_message>
alterações na revisão closes #27
</commit_message>
<xml_diff>
--- a/1º semestre/Revisões by danny/Revisão de Matemática Discreta.pptx
+++ b/1º semestre/Revisões by danny/Revisão de Matemática Discreta.pptx
@@ -133,7 +133,18 @@
   </p:defaultTextStyle>
   <p:extLst>
     <p:ext uri="{EFAFB233-063F-42B5-8137-9DF3F51BA10A}">
-      <p15:sldGuideLst xmlns:p15="http://schemas.microsoft.com/office/powerpoint/2012/main"/>
+      <p15:sldGuideLst xmlns:p15="http://schemas.microsoft.com/office/powerpoint/2012/main">
+        <p15:guide id="1" orient="horz" pos="2160">
+          <p15:clr>
+            <a:srgbClr val="A4A3A4"/>
+          </p15:clr>
+        </p15:guide>
+        <p15:guide id="2" pos="3840">
+          <p15:clr>
+            <a:srgbClr val="A4A3A4"/>
+          </p15:clr>
+        </p15:guide>
+      </p15:sldGuideLst>
     </p:ext>
   </p:extLst>
 </p:presentation>
@@ -221,7 +232,8 @@
           <a:p>
             <a:fld id="{9A02C3CF-9CFA-4B8C-9DF6-F57743F6B3BA}" type="datetimeFigureOut">
               <a:rPr lang="pt-BR" smtClean="0"/>
-              <a:t>16/04/2018</a:t>
+              <a:pPr/>
+              <a:t>18/04/2018</a:t>
             </a:fld>
             <a:endParaRPr lang="pt-BR"/>
           </a:p>
@@ -379,6 +391,7 @@
           <a:p>
             <a:fld id="{E22148CB-184D-4349-926D-2A849C95C113}" type="slidenum">
               <a:rPr lang="pt-BR" smtClean="0"/>
+              <a:pPr/>
               <a:t>‹nº›</a:t>
             </a:fld>
             <a:endParaRPr lang="pt-BR"/>
@@ -553,6 +566,7 @@
           <a:p>
             <a:fld id="{E22148CB-184D-4349-926D-2A849C95C113}" type="slidenum">
               <a:rPr lang="pt-BR" smtClean="0"/>
+              <a:pPr/>
               <a:t>7</a:t>
             </a:fld>
             <a:endParaRPr lang="pt-BR"/>
@@ -739,6 +753,7 @@
           <a:p>
             <a:fld id="{0F3C15E2-9B1B-443B-B0ED-0AA87BB005A0}" type="slidenum">
               <a:rPr lang="pt-BR" smtClean="0"/>
+              <a:pPr/>
               <a:t>‹nº›</a:t>
             </a:fld>
             <a:endParaRPr lang="pt-BR" dirty="0"/>
@@ -903,6 +918,7 @@
           <a:p>
             <a:fld id="{0F3C15E2-9B1B-443B-B0ED-0AA87BB005A0}" type="slidenum">
               <a:rPr lang="pt-BR" smtClean="0"/>
+              <a:pPr/>
               <a:t>‹nº›</a:t>
             </a:fld>
             <a:endParaRPr lang="pt-BR" dirty="0"/>
@@ -1077,6 +1093,7 @@
           <a:p>
             <a:fld id="{0F3C15E2-9B1B-443B-B0ED-0AA87BB005A0}" type="slidenum">
               <a:rPr lang="pt-BR" smtClean="0"/>
+              <a:pPr/>
               <a:t>‹nº›</a:t>
             </a:fld>
             <a:endParaRPr lang="pt-BR" dirty="0"/>
@@ -1241,6 +1258,7 @@
           <a:p>
             <a:fld id="{0F3C15E2-9B1B-443B-B0ED-0AA87BB005A0}" type="slidenum">
               <a:rPr lang="pt-BR" smtClean="0"/>
+              <a:pPr/>
               <a:t>‹nº›</a:t>
             </a:fld>
             <a:endParaRPr lang="pt-BR" dirty="0"/>
@@ -1482,6 +1500,7 @@
           <a:p>
             <a:fld id="{0F3C15E2-9B1B-443B-B0ED-0AA87BB005A0}" type="slidenum">
               <a:rPr lang="pt-BR" smtClean="0"/>
+              <a:pPr/>
               <a:t>‹nº›</a:t>
             </a:fld>
             <a:endParaRPr lang="pt-BR" dirty="0"/>
@@ -1707,6 +1726,7 @@
           <a:p>
             <a:fld id="{0F3C15E2-9B1B-443B-B0ED-0AA87BB005A0}" type="slidenum">
               <a:rPr lang="pt-BR" smtClean="0"/>
+              <a:pPr/>
               <a:t>‹nº›</a:t>
             </a:fld>
             <a:endParaRPr lang="pt-BR" dirty="0"/>
@@ -2067,6 +2087,7 @@
           <a:p>
             <a:fld id="{0F3C15E2-9B1B-443B-B0ED-0AA87BB005A0}" type="slidenum">
               <a:rPr lang="pt-BR" smtClean="0"/>
+              <a:pPr/>
               <a:t>‹nº›</a:t>
             </a:fld>
             <a:endParaRPr lang="pt-BR" dirty="0"/>
@@ -2180,6 +2201,7 @@
           <a:p>
             <a:fld id="{0F3C15E2-9B1B-443B-B0ED-0AA87BB005A0}" type="slidenum">
               <a:rPr lang="pt-BR" smtClean="0"/>
+              <a:pPr/>
               <a:t>‹nº›</a:t>
             </a:fld>
             <a:endParaRPr lang="pt-BR" dirty="0"/>
@@ -2271,6 +2293,7 @@
           <a:p>
             <a:fld id="{0F3C15E2-9B1B-443B-B0ED-0AA87BB005A0}" type="slidenum">
               <a:rPr lang="pt-BR" smtClean="0"/>
+              <a:pPr/>
               <a:t>‹nº›</a:t>
             </a:fld>
             <a:endParaRPr lang="pt-BR" dirty="0"/>
@@ -2542,6 +2565,7 @@
           <a:p>
             <a:fld id="{0F3C15E2-9B1B-443B-B0ED-0AA87BB005A0}" type="slidenum">
               <a:rPr lang="pt-BR" smtClean="0"/>
+              <a:pPr/>
               <a:t>‹nº›</a:t>
             </a:fld>
             <a:endParaRPr lang="pt-BR" dirty="0"/>
@@ -2790,6 +2814,7 @@
           <a:p>
             <a:fld id="{0F3C15E2-9B1B-443B-B0ED-0AA87BB005A0}" type="slidenum">
               <a:rPr lang="pt-BR" smtClean="0"/>
+              <a:pPr/>
               <a:t>‹nº›</a:t>
             </a:fld>
             <a:endParaRPr lang="pt-BR" dirty="0"/>
@@ -2936,7 +2961,7 @@
           <p:nvPr userDrawn="1"/>
         </p:nvPicPr>
         <p:blipFill>
-          <a:blip r:embed="rId13">
+          <a:blip r:embed="rId13" cstate="print">
             <a:extLst>
               <a:ext uri="{28A0092B-C50C-407E-A947-70E740481C1C}">
                 <a14:useLocalDpi xmlns:a14="http://schemas.microsoft.com/office/drawing/2010/main" val="0"/>
@@ -3814,7 +3839,7 @@
           <a:p>
             <a:r>
               <a:rPr lang="pt-BR" b="1" dirty="0"/>
-              <a:t>Funcional: [Relação de um da origem para no máximo um do destino]</a:t>
+              <a:t>Funcional: [Relação de um da origem para no máximo um do destino</a:t>
             </a:r>
             <a:br>
               <a:rPr lang="pt-BR" b="1" dirty="0"/>
@@ -3897,7 +3922,7 @@
             </a:pPr>
             <a:r>
               <a:rPr lang="pt-BR" dirty="0"/>
-              <a:t>	Na Matriz:	No máximo um valor verdadeiro em cada linha.</a:t>
+              <a:t>	Na Matriz: No máximo um valor verdadeiro em cada linha </a:t>
             </a:r>
           </a:p>
           <a:p>
@@ -3963,12 +3988,8 @@
           <a:lstStyle/>
           <a:p>
             <a:r>
-              <a:rPr lang="pt-BR" b="1" dirty="0"/>
-              <a:t>Injetora</a:t>
-            </a:r>
-            <a:r>
-              <a:rPr lang="pt-BR" dirty="0"/>
-              <a:t>: [O inverso da Funcional]</a:t>
+              <a:rPr lang="pt-BR" dirty="0"/>
+              <a:t>Injetora: [O inverso da Funcional]</a:t>
             </a:r>
           </a:p>
         </p:txBody>
@@ -3994,21 +4015,15 @@
           <a:bodyPr/>
           <a:lstStyle/>
           <a:p>
-            <a:pPr marL="0" indent="0">
-              <a:buNone/>
-            </a:pPr>
             <a:r>
               <a:rPr lang="pt-BR" dirty="0"/>
               <a:t>Seja uma relação</a:t>
             </a:r>
           </a:p>
           <a:p>
-            <a:pPr marL="0" indent="0">
-              <a:buNone/>
-            </a:pPr>
-            <a:r>
-              <a:rPr lang="pt-BR" dirty="0"/>
-              <a:t> R: A→B. R é injetora se </a:t>
+            <a:r>
+              <a:rPr lang="pt-BR" dirty="0"/>
+              <a:t> R: A→B. R é um injetora se </a:t>
             </a:r>
           </a:p>
           <a:p>
@@ -4028,9 +4043,6 @@
           </a:p>
           <a:p>
             <a:pPr marL="457200" lvl="1" indent="0">
-              <a:spcAft>
-                <a:spcPts val="2400"/>
-              </a:spcAft>
               <a:buNone/>
             </a:pPr>
             <a:r>
@@ -4040,9 +4052,6 @@
           </a:p>
           <a:p>
             <a:pPr marL="457200" lvl="1" indent="0">
-              <a:spcAft>
-                <a:spcPts val="2400"/>
-              </a:spcAft>
               <a:buNone/>
             </a:pPr>
             <a:r>
@@ -4060,9 +4069,6 @@
           </a:p>
           <a:p>
             <a:pPr marL="457200" lvl="1" indent="0">
-              <a:spcAft>
-                <a:spcPts val="2400"/>
-              </a:spcAft>
               <a:buNone/>
             </a:pPr>
             <a:r>
@@ -4738,15 +4744,7 @@
             </a:r>
             <a:r>
               <a:rPr lang="pt-BR" dirty="0"/>
-              <a:t>Seja A = {1,2,3,4} e B = {</a:t>
-            </a:r>
-            <a:r>
-              <a:rPr lang="pt-BR" dirty="0" err="1"/>
-              <a:t>A,E,i</a:t>
-            </a:r>
-            <a:r>
-              <a:rPr lang="pt-BR" dirty="0"/>
-              <a:t>} e </a:t>
+              <a:t>Seja A = {1,2,3,4} e B = {A,E,I} e </a:t>
             </a:r>
             <a:br>
               <a:rPr lang="pt-BR" dirty="0"/>
@@ -4902,7 +4900,7 @@
             </a:r>
             <a:r>
               <a:rPr lang="pt-BR" dirty="0"/>
-              <a:t>: Há pelo-menos um valor lógico verdadeiro para coluna. </a:t>
+              <a:t>: Há pelo-menos um valor lógico verdadeiro para coluna na matriz. </a:t>
             </a:r>
           </a:p>
           <a:p>
@@ -4981,7 +4979,7 @@
           <a:lstStyle/>
           <a:p>
             <a:r>
-              <a:rPr lang="pt-BR" b="1" dirty="0"/>
+              <a:rPr lang="pt-BR" dirty="0"/>
               <a:t>Monomorfismo</a:t>
             </a:r>
           </a:p>
@@ -5017,7 +5015,7 @@
             </a:r>
             <a:r>
               <a:rPr lang="pt-BR" dirty="0" err="1"/>
-              <a:t>monorelação</a:t>
+              <a:t>monorrelação</a:t>
             </a:r>
             <a:r>
               <a:rPr lang="pt-BR" dirty="0"/>
@@ -5453,7 +5451,7 @@
           <a:lstStyle/>
           <a:p>
             <a:r>
-              <a:rPr lang="pt-BR" b="1" dirty="0"/>
+              <a:rPr lang="pt-BR" dirty="0"/>
               <a:t>Epimorfismo</a:t>
             </a:r>
           </a:p>
@@ -5494,15 +5492,7 @@
             </a:pPr>
             <a:r>
               <a:rPr lang="pt-BR" dirty="0"/>
-              <a:t>	→</a:t>
-            </a:r>
-            <a:r>
-              <a:rPr lang="pt-BR" b="1" dirty="0"/>
-              <a:t> Sobrejetora </a:t>
-            </a:r>
-            <a:r>
-              <a:rPr lang="pt-BR" dirty="0"/>
-              <a:t>(Pelo menos um valor lógico verdadeiro por coluna) </a:t>
+              <a:t>	→ Sobrejetora (Pelo menos um valor lógico verdadeiro por coluna) </a:t>
             </a:r>
           </a:p>
           <a:p>
@@ -5511,15 +5501,7 @@
             </a:pPr>
             <a:r>
               <a:rPr lang="pt-BR" dirty="0"/>
-              <a:t>	→</a:t>
-            </a:r>
-            <a:r>
-              <a:rPr lang="pt-BR" b="1" dirty="0"/>
-              <a:t> Funcional </a:t>
-            </a:r>
-            <a:r>
-              <a:rPr lang="pt-BR" dirty="0"/>
-              <a:t>(Mínimo um valor verdadeiro por linha)</a:t>
+              <a:t>	→ Funcional (Mínimo um valor verdadeiro por linha)</a:t>
             </a:r>
           </a:p>
         </p:txBody>
@@ -5950,12 +5932,7 @@
             <p:ph idx="1"/>
           </p:nvPr>
         </p:nvSpPr>
-        <p:spPr>
-          <a:xfrm>
-            <a:off x="838200" y="1825625"/>
-            <a:ext cx="10515600" cy="4351338"/>
-          </a:xfrm>
-        </p:spPr>
+        <p:spPr/>
         <p:txBody>
           <a:bodyPr/>
           <a:lstStyle/>
@@ -6089,19 +6066,19 @@
               <a:buNone/>
             </a:pPr>
             <a:r>
-              <a:rPr lang="pt-BR" sz="3200" dirty="0"/>
+              <a:rPr lang="pt-BR" dirty="0"/>
               <a:t>Definindo conjuntos</a:t>
             </a:r>
           </a:p>
           <a:p>
             <a:r>
-              <a:rPr lang="pt-BR" sz="3200" dirty="0"/>
+              <a:rPr lang="pt-BR" dirty="0"/>
               <a:t>Ideia de agrupamento</a:t>
             </a:r>
           </a:p>
           <a:p>
             <a:r>
-              <a:rPr lang="pt-BR" sz="3200" dirty="0"/>
+              <a:rPr lang="pt-BR" dirty="0"/>
               <a:t>Estrutura que agrupa objetos com base para construir estruturas mais complexas.</a:t>
             </a:r>
           </a:p>
@@ -6197,15 +6174,7 @@
             </a:pPr>
             <a:r>
               <a:rPr lang="pt-BR" dirty="0"/>
-              <a:t>Uma endorrelação é uma relação binária interna de um conjunto (dança do passarinho). Também pode ser chamada “</a:t>
-            </a:r>
-            <a:r>
-              <a:rPr lang="pt-BR" dirty="0" err="1"/>
-              <a:t>autorrelação</a:t>
-            </a:r>
-            <a:r>
-              <a:rPr lang="pt-BR" dirty="0"/>
-              <a:t>”</a:t>
+              <a:t>Uma endorrelação é uma relação binária interna de um conjunto (dança do passarinho). Também pode ser chamada “autorrelação”</a:t>
             </a:r>
           </a:p>
           <a:p>
@@ -6641,12 +6610,7 @@
             <p:ph idx="1"/>
           </p:nvPr>
         </p:nvSpPr>
-        <p:spPr>
-          <a:xfrm>
-            <a:off x="838200" y="1825625"/>
-            <a:ext cx="10515600" cy="4351338"/>
-          </a:xfrm>
-        </p:spPr>
+        <p:spPr/>
         <p:txBody>
           <a:bodyPr/>
           <a:lstStyle/>
@@ -6672,7 +6636,7 @@
             </a:pPr>
             <a:r>
               <a:rPr lang="pt-BR" dirty="0"/>
-              <a:t>(∀ a ∈ A) (a R a) ∀ </a:t>
+              <a:t>(∀ a ∈ A) (a R a)  </a:t>
             </a:r>
           </a:p>
           <a:p>
@@ -6814,7 +6778,7 @@
             </a:r>
             <a:r>
               <a:rPr lang="pt-BR" dirty="0"/>
-              <a:t>) ~(</a:t>
+              <a:t>) ~ (</a:t>
             </a:r>
             <a:r>
               <a:rPr lang="pt-BR" dirty="0" err="1"/>
@@ -6838,7 +6802,7 @@
             </a:r>
             <a:r>
               <a:rPr lang="pt-BR" dirty="0"/>
-              <a:t>A diagonal principal da matriz só apresenta valores lógicos falsos </a:t>
+              <a:t>A diagonal principal da matriz só apresenta valores lógicos falso </a:t>
             </a:r>
           </a:p>
           <a:p>
@@ -6847,11 +6811,11 @@
             </a:pPr>
             <a:r>
               <a:rPr lang="pt-BR" b="1" dirty="0"/>
-              <a:t>No grafo: </a:t>
-            </a:r>
-            <a:r>
-              <a:rPr lang="pt-BR" dirty="0"/>
-              <a:t>Não tem dança do passarinho.</a:t>
+              <a:t>No grafo</a:t>
+            </a:r>
+            <a:r>
+              <a:rPr lang="pt-BR" dirty="0"/>
+              <a:t>: Não tem dança do passarinho.</a:t>
             </a:r>
           </a:p>
           <a:p>
@@ -7075,7 +7039,7 @@
           <a:p>
             <a:r>
               <a:rPr lang="pt-BR" dirty="0"/>
-              <a:t>Relação Assimétrica</a:t>
+              <a:t>Relação Antissimétrica</a:t>
             </a:r>
           </a:p>
         </p:txBody>
@@ -8153,9 +8117,6 @@
             </a:r>
           </a:p>
           <a:p>
-            <a:pPr marL="0" indent="0">
-              <a:buNone/>
-            </a:pPr>
             <a:r>
               <a:rPr lang="pt-BR" b="1" dirty="0"/>
               <a:t>Intersecção(∩) </a:t>
@@ -8217,14 +8178,13 @@
             </a:r>
           </a:p>
           <a:p>
-            <a:pPr marL="0" indent="0">
+            <a:pPr>
               <a:spcBef>
                 <a:spcPts val="0"/>
               </a:spcBef>
               <a:spcAft>
                 <a:spcPts val="2400"/>
               </a:spcAft>
-              <a:buNone/>
             </a:pPr>
             <a:r>
               <a:rPr lang="pt-BR" b="1" dirty="0"/>
@@ -8369,11 +8329,10 @@
             </a:r>
           </a:p>
           <a:p>
-            <a:pPr marL="0" indent="0">
+            <a:pPr>
               <a:spcAft>
                 <a:spcPts val="2400"/>
               </a:spcAft>
-              <a:buNone/>
             </a:pPr>
             <a:r>
               <a:rPr lang="pt-BR" sz="2400" dirty="0"/>
@@ -8417,9 +8376,6 @@
             </a:r>
           </a:p>
           <a:p>
-            <a:pPr marL="0" indent="0">
-              <a:buNone/>
-            </a:pPr>
             <a:r>
               <a:rPr lang="pt-BR" sz="2400" b="1" dirty="0"/>
               <a:t>Conjunto Complementar (C) : </a:t>
@@ -8453,7 +8409,7 @@
             </a:pPr>
             <a:r>
               <a:rPr lang="pt-BR" sz="2400" dirty="0"/>
-              <a:t>        C(a) = {1,3,5,7, ….. ,19} </a:t>
+              <a:t>       C(a) = {1,3,5,7, ….. ,19} </a:t>
             </a:r>
           </a:p>
           <a:p>
@@ -8462,7 +8418,7 @@
             </a:pPr>
             <a:r>
               <a:rPr lang="pt-BR" sz="2400" dirty="0"/>
-              <a:t>U :  ______________________________                                           </a:t>
+              <a:t>U =    _____________________________                                           </a:t>
             </a:r>
           </a:p>
           <a:p>
@@ -8471,13 +8427,8 @@
             </a:pPr>
             <a:r>
               <a:rPr lang="pt-BR" sz="2400" dirty="0"/>
-              <a:t>A </a:t>
-            </a:r>
-            <a:r>
-              <a:rPr lang="pt-BR" sz="2400"/>
-              <a:t>:                      ___________________                               </a:t>
-            </a:r>
-            <a:endParaRPr lang="pt-BR" sz="2400" dirty="0"/>
+              <a:t>A =                   ._____________________                               </a:t>
+            </a:r>
           </a:p>
           <a:p>
             <a:pPr marL="0" indent="0">
@@ -8485,7 +8436,11 @@
             </a:pPr>
             <a:r>
               <a:rPr lang="pt-BR" sz="2400" dirty="0"/>
-              <a:t>C(a) : __________</a:t>
+              <a:t>C(a) =</a:t>
+            </a:r>
+            <a:r>
+              <a:rPr lang="pt-BR" sz="2400" u="sng" dirty="0"/>
+              <a:t>________.</a:t>
             </a:r>
           </a:p>
           <a:p>
@@ -8555,9 +8510,6 @@
           <a:bodyPr/>
           <a:lstStyle/>
           <a:p>
-            <a:pPr marL="0" indent="0">
-              <a:buNone/>
-            </a:pPr>
             <a:r>
               <a:rPr lang="pt-BR" b="1" dirty="0"/>
               <a:t>Conjunto das Partes (P(x)) : </a:t>
@@ -8584,15 +8536,9 @@
             </a:r>
           </a:p>
           <a:p>
-            <a:pPr marL="0" indent="0">
-              <a:buNone/>
-            </a:pPr>
             <a:endParaRPr lang="pt-BR" dirty="0"/>
           </a:p>
           <a:p>
-            <a:pPr marL="0" indent="0">
-              <a:buNone/>
-            </a:pPr>
             <a:r>
               <a:rPr lang="pt-BR" dirty="0"/>
               <a:t>Ex.: Seja A conjunto gerador A = {1,2,3}</a:t>
@@ -8835,7 +8781,7 @@
     </a:clrScheme>
     <a:fontScheme name="Century Schoolbook">
       <a:majorFont>
-        <a:latin typeface="Century Schoolbook" panose="02040604050505020304"/>
+        <a:latin typeface="Century Schoolbook"/>
         <a:ea typeface=""/>
         <a:cs typeface=""/>
         <a:font script="Jpan" typeface="ＭＳ Ｐ明朝"/>
@@ -8870,7 +8816,7 @@
         <a:font script="Geor" typeface="Sylfaen"/>
       </a:majorFont>
       <a:minorFont>
-        <a:latin typeface="Century Schoolbook" panose="02040604050505020304"/>
+        <a:latin typeface="Century Schoolbook"/>
         <a:ea typeface=""/>
         <a:cs typeface=""/>
         <a:font script="Jpan" typeface="ＭＳ Ｐ明朝"/>
@@ -9096,7 +9042,7 @@
     </a:clrScheme>
     <a:fontScheme name="Office">
       <a:majorFont>
-        <a:latin typeface="Calibri Light" panose="020F0302020204030204"/>
+        <a:latin typeface="Calibri Light"/>
         <a:ea typeface=""/>
         <a:cs typeface=""/>
         <a:font script="Jpan" typeface="游ゴシック Light"/>
@@ -9148,7 +9094,7 @@
         <a:font script="Tfng" typeface="Ebrima"/>
       </a:majorFont>
       <a:minorFont>
-        <a:latin typeface="Calibri" panose="020F0502020204030204"/>
+        <a:latin typeface="Calibri"/>
         <a:ea typeface=""/>
         <a:cs typeface=""/>
         <a:font script="Jpan" typeface="游ゴシック"/>

</xml_diff>